<commit_message>
header margin for profile updated
</commit_message>
<xml_diff>
--- a/Presentations/Nayi Disha.pptx
+++ b/Presentations/Nayi Disha.pptx
@@ -9589,7 +9589,7 @@
             <a:fld id="{C4D5ADD5-2BBC-4A94-8F86-D9013941F742}" type="datetimeFigureOut">
               <a:rPr lang="en-US"/>
               <a:pPr/>
-              <a:t>28-Aug-24</a:t>
+              <a:t>17-Sep-24</a:t>
             </a:fld>
             <a:endParaRPr lang="en-US"/>
           </a:p>
@@ -10862,7 +10862,7 @@
           <a:p>
             <a:fld id="{E60792E3-D524-454C-8AFD-A91972900BCB}" type="datetime1">
               <a:rPr lang="en-US" smtClean="0"/>
-              <a:t>28-Aug-24</a:t>
+              <a:t>17-Sep-24</a:t>
             </a:fld>
             <a:endParaRPr lang="en-US"/>
           </a:p>
@@ -11044,7 +11044,7 @@
           <a:p>
             <a:fld id="{053C3A68-6922-42D3-8905-ECC2D82A3469}" type="datetime1">
               <a:rPr lang="en-US" smtClean="0"/>
-              <a:t>28-Aug-24</a:t>
+              <a:t>17-Sep-24</a:t>
             </a:fld>
             <a:endParaRPr lang="en-US"/>
           </a:p>
@@ -11236,7 +11236,7 @@
           <a:p>
             <a:fld id="{CB69E9F4-7604-4950-A8B2-8ACDEDB1506E}" type="datetime1">
               <a:rPr lang="en-US" smtClean="0"/>
-              <a:t>28-Aug-24</a:t>
+              <a:t>17-Sep-24</a:t>
             </a:fld>
             <a:endParaRPr lang="en-US"/>
           </a:p>
@@ -11418,7 +11418,7 @@
           <a:p>
             <a:fld id="{708B7524-32A2-4C20-A58C-BC3BAA1042FC}" type="datetime1">
               <a:rPr lang="en-US" smtClean="0"/>
-              <a:t>28-Aug-24</a:t>
+              <a:t>17-Sep-24</a:t>
             </a:fld>
             <a:endParaRPr lang="en-US"/>
           </a:p>
@@ -11677,7 +11677,7 @@
           <a:p>
             <a:fld id="{1E994447-D6B2-43BB-A877-57F1A267B999}" type="datetime1">
               <a:rPr lang="en-US" smtClean="0"/>
-              <a:t>28-Aug-24</a:t>
+              <a:t>17-Sep-24</a:t>
             </a:fld>
             <a:endParaRPr lang="en-US"/>
           </a:p>
@@ -11976,7 +11976,7 @@
           <a:p>
             <a:fld id="{68920E16-BD35-483C-AA6B-346FC7E46DEA}" type="datetime1">
               <a:rPr lang="en-US" smtClean="0"/>
-              <a:t>28-Aug-24</a:t>
+              <a:t>17-Sep-24</a:t>
             </a:fld>
             <a:endParaRPr lang="en-US"/>
           </a:p>
@@ -12409,7 +12409,7 @@
           <a:p>
             <a:fld id="{2FEAC6F8-5103-4FC0-A69E-5C6AE6469DA8}" type="datetime1">
               <a:rPr lang="en-US" smtClean="0"/>
-              <a:t>28-Aug-24</a:t>
+              <a:t>17-Sep-24</a:t>
             </a:fld>
             <a:endParaRPr lang="en-US"/>
           </a:p>
@@ -12540,7 +12540,7 @@
           <a:p>
             <a:fld id="{C60C6921-0627-4C8F-83D5-0CF936D2FFDD}" type="datetime1">
               <a:rPr lang="en-US" smtClean="0"/>
-              <a:t>28-Aug-24</a:t>
+              <a:t>17-Sep-24</a:t>
             </a:fld>
             <a:endParaRPr lang="en-US"/>
           </a:p>
@@ -12649,7 +12649,7 @@
           <a:p>
             <a:fld id="{2FF08AD7-8103-40F8-983C-E2BA6BB9CBE0}" type="datetime1">
               <a:rPr lang="en-US" smtClean="0"/>
-              <a:t>28-Aug-24</a:t>
+              <a:t>17-Sep-24</a:t>
             </a:fld>
             <a:endParaRPr lang="en-US"/>
           </a:p>
@@ -12938,7 +12938,7 @@
           <a:p>
             <a:fld id="{DF8C06B4-9380-4A4D-AF49-A3596E17DAF5}" type="datetime1">
               <a:rPr lang="en-US" smtClean="0"/>
-              <a:t>28-Aug-24</a:t>
+              <a:t>17-Sep-24</a:t>
             </a:fld>
             <a:endParaRPr lang="en-US"/>
           </a:p>
@@ -13207,7 +13207,7 @@
           <a:p>
             <a:fld id="{EF7FDEF1-C582-4E22-9E77-D68326471F28}" type="datetime1">
               <a:rPr lang="en-US" smtClean="0"/>
-              <a:t>28-Aug-24</a:t>
+              <a:t>17-Sep-24</a:t>
             </a:fld>
             <a:endParaRPr lang="en-US"/>
           </a:p>
@@ -13450,7 +13450,7 @@
           <a:p>
             <a:fld id="{780A9602-A9A9-453F-AEF1-37B5837E02CD}" type="datetime1">
               <a:rPr lang="en-US" smtClean="0"/>
-              <a:t>28-Aug-24</a:t>
+              <a:t>17-Sep-24</a:t>
             </a:fld>
             <a:endParaRPr lang="en-US"/>
           </a:p>

</xml_diff>